<commit_message>
Add more references to best practises, updated README
</commit_message>
<xml_diff>
--- a/slides/Tag-3_2-Best-Practices.pptx
+++ b/slides/Tag-3_2-Best-Practices.pptx
@@ -4936,7 +4936,7 @@
               <a:pPr algn="ctr">
                 <a:defRPr/>
               </a:pPr>
-              <a:t>25.05.2021</a:t>
+              <a:t>28.05.2021</a:t>
             </a:fld>
             <a:endParaRPr lang="de-DE" sz="1000" dirty="0">
               <a:solidFill>
@@ -7072,17 +7072,10 @@
               <a:t>Nach: Apache </a:t>
             </a:r>
             <a:r>
-              <a:rPr lang="de-DE" sz="2000" i="1" dirty="0" err="1"/>
+              <a:rPr lang="de-DE" sz="2000" i="1" smtClean="0"/>
               <a:t>Wicket</a:t>
             </a:r>
-            <a:r>
-              <a:rPr lang="de-DE" sz="2000" i="1" dirty="0"/>
-              <a:t> Guide </a:t>
-            </a:r>
-            <a:r>
-              <a:rPr lang="de-DE" sz="2000" i="1" dirty="0" smtClean="0"/>
-              <a:t>6</a:t>
-            </a:r>
+            <a:endParaRPr lang="de-DE" sz="2000" i="1" dirty="0" smtClean="0"/>
           </a:p>
           <a:p>
             <a:pPr marL="0" indent="0" algn="ctr">
@@ -7100,10 +7093,47 @@
               </a:rPr>
               <a:t>ci.apache.org/projects/wicket/guide/6.x/guide/bestpractices.html</a:t>
             </a:r>
+            <a:endParaRPr lang="de-DE" sz="2000" i="1" dirty="0"/>
+          </a:p>
+          <a:p>
+            <a:pPr marL="0" indent="0" algn="ctr">
+              <a:buNone/>
+            </a:pPr>
+            <a:r>
+              <a:rPr lang="de-DE" sz="2000" i="1" dirty="0">
+                <a:hlinkClick r:id="rId3"/>
+              </a:rPr>
+              <a:t>https://</a:t>
+            </a:r>
+            <a:r>
+              <a:rPr lang="de-DE" sz="2000" i="1" dirty="0" smtClean="0">
+                <a:hlinkClick r:id="rId3"/>
+              </a:rPr>
+              <a:t>cwiki.apache.org/confluence/display/WICKET/Best+Practices+and+Gotchas</a:t>
+            </a:r>
+            <a:endParaRPr lang="de-DE" sz="2000" i="1" dirty="0" smtClean="0"/>
+          </a:p>
+          <a:p>
+            <a:pPr marL="0" indent="0" algn="ctr">
+              <a:buNone/>
+            </a:pPr>
+            <a:r>
+              <a:rPr lang="de-DE" sz="2000" i="1" dirty="0">
+                <a:hlinkClick r:id="rId4"/>
+              </a:rPr>
+              <a:t>https://ci.apache.org/projects/wicket/guide/9.x/single.html#_</a:t>
+            </a:r>
+            <a:r>
+              <a:rPr lang="de-DE" sz="2000" i="1" dirty="0" smtClean="0">
+                <a:hlinkClick r:id="rId4"/>
+              </a:rPr>
+              <a:t>wicket_best_practices</a:t>
+            </a:r>
             <a:r>
               <a:rPr lang="de-DE" sz="2000" i="1" dirty="0" smtClean="0"/>
               <a:t> </a:t>
             </a:r>
+            <a:endParaRPr lang="de-DE" sz="2000" i="1" dirty="0" smtClean="0"/>
           </a:p>
           <a:p>
             <a:pPr marL="0" indent="0" algn="ctr">

</xml_diff>